<commit_message>
Make tabs for new_user site, aesthetic changes
</commit_message>
<xml_diff>
--- a/mandalinka/Sites ideas/websites.pptx
+++ b/mandalinka/Sites ideas/websites.pptx
@@ -3378,7 +3378,7 @@
         </p:nvSpPr>
         <p:spPr>
           <a:xfrm>
-            <a:off x="2785312" y="1094704"/>
+            <a:off x="3145920" y="1094704"/>
             <a:ext cx="6333288" cy="4668592"/>
           </a:xfrm>
           <a:prstGeom prst="roundRect">
@@ -3808,7 +3808,7 @@
           <a:p>
             <a:pPr algn="ctr"/>
             <a:r>
-              <a:rPr lang="sk-SK">
+              <a:rPr lang="sk-SK" dirty="0">
                 <a:solidFill>
                   <a:schemeClr val="tx1"/>
                 </a:solidFill>

</xml_diff>